<commit_message>
Preentation - final version
</commit_message>
<xml_diff>
--- a/238657_prezentacja.pptx
+++ b/238657_prezentacja.pptx
@@ -281,7 +281,7 @@
               <a:pPr>
                 <a:defRPr/>
               </a:pPr>
-              <a:t>06.07.2020</a:t>
+              <a:t>19.07.2020</a:t>
             </a:fld>
             <a:endParaRPr lang="pl-PL"/>
           </a:p>
@@ -499,7 +499,7 @@
               <a:pPr>
                 <a:defRPr/>
               </a:pPr>
-              <a:t>06.07.2020</a:t>
+              <a:t>19.07.2020</a:t>
             </a:fld>
             <a:endParaRPr lang="pl-PL"/>
           </a:p>
@@ -6668,21 +6668,8 @@
             </a:pPr>
             <a:r>
               <a:rPr lang="pl-PL" altLang="en-PL" sz="2400" dirty="0"/>
-              <a:t>          Klasyczna komórka	</a:t>
-            </a:r>
-            <a:r>
-              <a:rPr lang="pl-PL" altLang="en-PL" dirty="0"/>
-              <a:t>	    </a:t>
-            </a:r>
-            <a:r>
-              <a:rPr lang="pl-PL" altLang="en-PL" sz="2400" dirty="0"/>
-              <a:t>Komórka LSTM</a:t>
-            </a:r>
-          </a:p>
-          <a:p>
-            <a:pPr marL="0" indent="0">
-              <a:buNone/>
-            </a:pPr>
+              <a:t>          </a:t>
+            </a:r>
             <a:endParaRPr lang="pl-PL" altLang="en-PL" dirty="0"/>
           </a:p>
           <a:p>
@@ -6774,14 +6761,16 @@
       </p:sp>
       <p:pic>
         <p:nvPicPr>
-          <p:cNvPr id="5" name="Picture 4" descr="A close up of a clock&#10;&#10;Description automatically generated">
+          <p:cNvPr id="3" name="Picture 2" descr="A picture containing clock&#10;&#10;Description automatically generated">
             <a:extLst>
               <a:ext uri="{FF2B5EF4-FFF2-40B4-BE49-F238E27FC236}">
-                <a16:creationId xmlns:a16="http://schemas.microsoft.com/office/drawing/2014/main" id="{AA723C9E-FB19-0448-95BC-AB0CE3FCCD70}"/>
+                <a16:creationId xmlns:a16="http://schemas.microsoft.com/office/drawing/2014/main" id="{410C0AA5-E119-254C-A5B8-A28862B986F8}"/>
               </a:ext>
             </a:extLst>
           </p:cNvPr>
-          <p:cNvPicPr/>
+          <p:cNvPicPr>
+            <a:picLocks noChangeAspect="1"/>
+          </p:cNvPicPr>
           <p:nvPr/>
         </p:nvPicPr>
         <p:blipFill>
@@ -6798,42 +6787,8 @@
         </p:blipFill>
         <p:spPr>
           <a:xfrm>
-            <a:off x="4882294" y="2780928"/>
-            <a:ext cx="3994812" cy="2382520"/>
-          </a:xfrm>
-          <a:prstGeom prst="rect">
-            <a:avLst/>
-          </a:prstGeom>
-        </p:spPr>
-      </p:pic>
-      <p:pic>
-        <p:nvPicPr>
-          <p:cNvPr id="6" name="Picture 5" descr="A close up of a sign&#10;&#10;Description automatically generated">
-            <a:extLst>
-              <a:ext uri="{FF2B5EF4-FFF2-40B4-BE49-F238E27FC236}">
-                <a16:creationId xmlns:a16="http://schemas.microsoft.com/office/drawing/2014/main" id="{EC322EC9-AEA6-B44A-999C-FBFF7647237B}"/>
-              </a:ext>
-            </a:extLst>
-          </p:cNvPr>
-          <p:cNvPicPr/>
-          <p:nvPr/>
-        </p:nvPicPr>
-        <p:blipFill>
-          <a:blip r:embed="rId3">
-            <a:extLst>
-              <a:ext uri="{28A0092B-C50C-407E-A947-70E740481C1C}">
-                <a14:useLocalDpi xmlns:a14="http://schemas.microsoft.com/office/drawing/2010/main" val="0"/>
-              </a:ext>
-            </a:extLst>
-          </a:blip>
-          <a:stretch>
-            <a:fillRect/>
-          </a:stretch>
-        </p:blipFill>
-        <p:spPr>
-          <a:xfrm>
-            <a:off x="755650" y="2780928"/>
-            <a:ext cx="3806190" cy="2382520"/>
+            <a:off x="1979712" y="2708920"/>
+            <a:ext cx="5794452" cy="3024336"/>
           </a:xfrm>
           <a:prstGeom prst="rect">
             <a:avLst/>
@@ -7167,7 +7122,7 @@
             </a:pPr>
             <a:r>
               <a:rPr lang="pl-PL" altLang="en-PL" dirty="0"/>
-              <a:t>Autoenkoder z dwukierunkowymi warstwami LSTM</a:t>
+              <a:t>Autoenkoder z warstwami rekurencyjnymi</a:t>
             </a:r>
           </a:p>
           <a:p>

</xml_diff>